<commit_message>
v-0.1.0 - First model and presentation steps
</commit_message>
<xml_diff>
--- a/RoadMap.pptx
+++ b/RoadMap.pptx
@@ -5,7 +5,7 @@
     <p:sldMasterId id="2147483659" r:id="rId1"/>
   </p:sldMasterIdLst>
   <p:notesMasterIdLst>
-    <p:notesMasterId r:id="rId12"/>
+    <p:notesMasterId r:id="rId15"/>
   </p:notesMasterIdLst>
   <p:sldIdLst>
     <p:sldId id="256" r:id="rId2"/>
@@ -18,21 +18,24 @@
     <p:sldId id="263" r:id="rId9"/>
     <p:sldId id="264" r:id="rId10"/>
     <p:sldId id="265" r:id="rId11"/>
+    <p:sldId id="266" r:id="rId12"/>
+    <p:sldId id="267" r:id="rId13"/>
+    <p:sldId id="268" r:id="rId14"/>
   </p:sldIdLst>
   <p:sldSz cx="9144000" cy="5143500" type="screen16x9"/>
   <p:notesSz cx="6858000" cy="9144000"/>
   <p:embeddedFontLst>
     <p:embeddedFont>
-      <p:font typeface="Roboto" panose="020B0604020202020204" charset="0"/>
-      <p:regular r:id="rId13"/>
-      <p:bold r:id="rId14"/>
-      <p:italic r:id="rId15"/>
-      <p:boldItalic r:id="rId16"/>
+      <p:font typeface="Comfortaa" panose="020B0604020202020204" charset="0"/>
+      <p:regular r:id="rId16"/>
+      <p:bold r:id="rId17"/>
     </p:embeddedFont>
     <p:embeddedFont>
-      <p:font typeface="Comfortaa" panose="020B0604020202020204" charset="0"/>
-      <p:regular r:id="rId17"/>
-      <p:bold r:id="rId18"/>
+      <p:font typeface="Roboto" panose="020B0604020202020204" charset="0"/>
+      <p:regular r:id="rId18"/>
+      <p:bold r:id="rId19"/>
+      <p:italic r:id="rId20"/>
+      <p:boldItalic r:id="rId21"/>
     </p:embeddedFont>
   </p:embeddedFontLst>
   <p:defaultTextStyle>
@@ -7202,6 +7205,1333 @@
 </p:sld>
 </file>
 
+<file path=ppt/slides/slide11.xml><?xml version="1.0" encoding="utf-8"?>
+<p:sld xmlns:a="http://schemas.openxmlformats.org/drawingml/2006/main" xmlns:r="http://schemas.openxmlformats.org/officeDocument/2006/relationships" xmlns:p="http://schemas.openxmlformats.org/presentationml/2006/main">
+  <p:cSld>
+    <p:spTree>
+      <p:nvGrpSpPr>
+        <p:cNvPr id="1" name=""/>
+        <p:cNvGrpSpPr/>
+        <p:nvPr/>
+      </p:nvGrpSpPr>
+      <p:grpSpPr>
+        <a:xfrm>
+          <a:off x="0" y="0"/>
+          <a:ext cx="0" cy="0"/>
+          <a:chOff x="0" y="0"/>
+          <a:chExt cx="0" cy="0"/>
+        </a:xfrm>
+      </p:grpSpPr>
+      <p:sp>
+        <p:nvSpPr>
+          <p:cNvPr id="2" name="Заголовок 1"/>
+          <p:cNvSpPr>
+            <a:spLocks noGrp="1"/>
+          </p:cNvSpPr>
+          <p:nvPr>
+            <p:ph type="title"/>
+          </p:nvPr>
+        </p:nvSpPr>
+        <p:spPr>
+          <a:xfrm>
+            <a:off x="311700" y="445025"/>
+            <a:ext cx="2073990" cy="572700"/>
+          </a:xfrm>
+        </p:spPr>
+        <p:txBody>
+          <a:bodyPr>
+            <a:normAutofit fontScale="90000"/>
+          </a:bodyPr>
+          <a:lstStyle/>
+          <a:p>
+            <a:r>
+              <a:rPr lang="en-US" dirty="0" smtClean="0">
+                <a:latin typeface="Comfortaa" panose="020B0604020202020204" charset="0"/>
+              </a:rPr>
+              <a:t>1. Planning</a:t>
+            </a:r>
+            <a:endParaRPr lang="ru-RU" dirty="0">
+              <a:latin typeface="Comfortaa" panose="020B0604020202020204" charset="0"/>
+            </a:endParaRPr>
+          </a:p>
+        </p:txBody>
+      </p:sp>
+      <p:sp>
+        <p:nvSpPr>
+          <p:cNvPr id="3" name="Текст 2"/>
+          <p:cNvSpPr>
+            <a:spLocks noGrp="1"/>
+          </p:cNvSpPr>
+          <p:nvPr>
+            <p:ph type="body" idx="1"/>
+          </p:nvPr>
+        </p:nvSpPr>
+        <p:spPr/>
+        <p:txBody>
+          <a:bodyPr/>
+          <a:lstStyle/>
+          <a:p>
+            <a:pPr>
+              <a:buFontTx/>
+              <a:buChar char="-"/>
+            </a:pPr>
+            <a:r>
+              <a:rPr lang="en-US" dirty="0" smtClean="0">
+                <a:solidFill>
+                  <a:schemeClr val="tx1"/>
+                </a:solidFill>
+                <a:latin typeface="Roboto" panose="020B0604020202020204" charset="0"/>
+                <a:ea typeface="Roboto" panose="020B0604020202020204" charset="0"/>
+              </a:rPr>
+              <a:t>Communication: Telegram+ Discord</a:t>
+            </a:r>
+          </a:p>
+          <a:p>
+            <a:pPr>
+              <a:buFontTx/>
+              <a:buChar char="-"/>
+            </a:pPr>
+            <a:r>
+              <a:rPr lang="en-US" dirty="0" smtClean="0">
+                <a:solidFill>
+                  <a:schemeClr val="tx1"/>
+                </a:solidFill>
+                <a:latin typeface="Roboto" panose="020B0604020202020204" charset="0"/>
+                <a:ea typeface="Roboto" panose="020B0604020202020204" charset="0"/>
+              </a:rPr>
+              <a:t>Planning: Trello, Notion</a:t>
+            </a:r>
+          </a:p>
+          <a:p>
+            <a:pPr>
+              <a:buFontTx/>
+              <a:buChar char="-"/>
+            </a:pPr>
+            <a:r>
+              <a:rPr lang="en-US" dirty="0" smtClean="0">
+                <a:solidFill>
+                  <a:schemeClr val="tx1"/>
+                </a:solidFill>
+                <a:latin typeface="Roboto" panose="020B0604020202020204" charset="0"/>
+                <a:ea typeface="Roboto" panose="020B0604020202020204" charset="0"/>
+              </a:rPr>
+              <a:t>GitHub Repo: </a:t>
+            </a:r>
+            <a:r>
+              <a:rPr lang="en-US" dirty="0" smtClean="0">
+                <a:solidFill>
+                  <a:schemeClr val="tx1"/>
+                </a:solidFill>
+                <a:latin typeface="Roboto" panose="020B0604020202020204" charset="0"/>
+                <a:ea typeface="Roboto" panose="020B0604020202020204" charset="0"/>
+                <a:hlinkClick r:id="rId2"/>
+              </a:rPr>
+              <a:t>https://github.com/PolukarovIvan/MTC.Teta_2PiK</a:t>
+            </a:r>
+            <a:endParaRPr lang="en-US" dirty="0" smtClean="0">
+              <a:solidFill>
+                <a:schemeClr val="tx1"/>
+              </a:solidFill>
+              <a:latin typeface="Roboto" panose="020B0604020202020204" charset="0"/>
+              <a:ea typeface="Roboto" panose="020B0604020202020204" charset="0"/>
+            </a:endParaRPr>
+          </a:p>
+          <a:p>
+            <a:pPr marL="114300" indent="0">
+              <a:buNone/>
+            </a:pPr>
+            <a:endParaRPr lang="ru-RU" dirty="0">
+              <a:solidFill>
+                <a:schemeClr val="tx1"/>
+              </a:solidFill>
+              <a:latin typeface="Roboto" panose="020B0604020202020204" charset="0"/>
+              <a:ea typeface="Roboto" panose="020B0604020202020204" charset="0"/>
+            </a:endParaRPr>
+          </a:p>
+        </p:txBody>
+      </p:sp>
+      <p:sp>
+        <p:nvSpPr>
+          <p:cNvPr id="4" name="Заголовок 1"/>
+          <p:cNvSpPr txBox="1">
+            <a:spLocks/>
+          </p:cNvSpPr>
+          <p:nvPr/>
+        </p:nvSpPr>
+        <p:spPr>
+          <a:xfrm>
+            <a:off x="6758310" y="445025"/>
+            <a:ext cx="2073990" cy="572700"/>
+          </a:xfrm>
+          <a:prstGeom prst="rect">
+            <a:avLst/>
+          </a:prstGeom>
+          <a:noFill/>
+          <a:ln>
+            <a:noFill/>
+          </a:ln>
+        </p:spPr>
+        <p:txBody>
+          <a:bodyPr spcFirstLastPara="1" wrap="square" lIns="91425" tIns="91425" rIns="91425" bIns="91425" anchor="t" anchorCtr="0">
+            <a:normAutofit fontScale="97500" lnSpcReduction="10000"/>
+          </a:bodyPr>
+          <a:lstStyle>
+            <a:defPPr marR="0" lvl="0" algn="l" rtl="0">
+              <a:lnSpc>
+                <a:spcPct val="100000"/>
+              </a:lnSpc>
+              <a:spcBef>
+                <a:spcPts val="0"/>
+              </a:spcBef>
+              <a:spcAft>
+                <a:spcPts val="0"/>
+              </a:spcAft>
+            </a:defPPr>
+            <a:lvl1pPr marR="0" lvl="0" algn="l" rtl="0">
+              <a:lnSpc>
+                <a:spcPct val="100000"/>
+              </a:lnSpc>
+              <a:spcBef>
+                <a:spcPts val="0"/>
+              </a:spcBef>
+              <a:spcAft>
+                <a:spcPts val="0"/>
+              </a:spcAft>
+              <a:buClr>
+                <a:schemeClr val="dk1"/>
+              </a:buClr>
+              <a:buSzPts val="2800"/>
+              <a:buFont typeface="Arial"/>
+              <a:buNone/>
+              <a:defRPr sz="2800" b="0" i="0" u="none" strike="noStrike" cap="none">
+                <a:solidFill>
+                  <a:schemeClr val="dk1"/>
+                </a:solidFill>
+                <a:latin typeface="Arial"/>
+                <a:ea typeface="Arial"/>
+                <a:cs typeface="Arial"/>
+                <a:sym typeface="Arial"/>
+              </a:defRPr>
+            </a:lvl1pPr>
+            <a:lvl2pPr marR="0" lvl="1" algn="l" rtl="0">
+              <a:lnSpc>
+                <a:spcPct val="100000"/>
+              </a:lnSpc>
+              <a:spcBef>
+                <a:spcPts val="0"/>
+              </a:spcBef>
+              <a:spcAft>
+                <a:spcPts val="0"/>
+              </a:spcAft>
+              <a:buClr>
+                <a:schemeClr val="dk1"/>
+              </a:buClr>
+              <a:buSzPts val="2800"/>
+              <a:buFont typeface="Arial"/>
+              <a:buNone/>
+              <a:defRPr sz="2800" b="0" i="0" u="none" strike="noStrike" cap="none">
+                <a:solidFill>
+                  <a:schemeClr val="dk1"/>
+                </a:solidFill>
+                <a:latin typeface="Arial"/>
+                <a:ea typeface="Arial"/>
+                <a:cs typeface="Arial"/>
+                <a:sym typeface="Arial"/>
+              </a:defRPr>
+            </a:lvl2pPr>
+            <a:lvl3pPr marR="0" lvl="2" algn="l" rtl="0">
+              <a:lnSpc>
+                <a:spcPct val="100000"/>
+              </a:lnSpc>
+              <a:spcBef>
+                <a:spcPts val="0"/>
+              </a:spcBef>
+              <a:spcAft>
+                <a:spcPts val="0"/>
+              </a:spcAft>
+              <a:buClr>
+                <a:schemeClr val="dk1"/>
+              </a:buClr>
+              <a:buSzPts val="2800"/>
+              <a:buFont typeface="Arial"/>
+              <a:buNone/>
+              <a:defRPr sz="2800" b="0" i="0" u="none" strike="noStrike" cap="none">
+                <a:solidFill>
+                  <a:schemeClr val="dk1"/>
+                </a:solidFill>
+                <a:latin typeface="Arial"/>
+                <a:ea typeface="Arial"/>
+                <a:cs typeface="Arial"/>
+                <a:sym typeface="Arial"/>
+              </a:defRPr>
+            </a:lvl3pPr>
+            <a:lvl4pPr marR="0" lvl="3" algn="l" rtl="0">
+              <a:lnSpc>
+                <a:spcPct val="100000"/>
+              </a:lnSpc>
+              <a:spcBef>
+                <a:spcPts val="0"/>
+              </a:spcBef>
+              <a:spcAft>
+                <a:spcPts val="0"/>
+              </a:spcAft>
+              <a:buClr>
+                <a:schemeClr val="dk1"/>
+              </a:buClr>
+              <a:buSzPts val="2800"/>
+              <a:buFont typeface="Arial"/>
+              <a:buNone/>
+              <a:defRPr sz="2800" b="0" i="0" u="none" strike="noStrike" cap="none">
+                <a:solidFill>
+                  <a:schemeClr val="dk1"/>
+                </a:solidFill>
+                <a:latin typeface="Arial"/>
+                <a:ea typeface="Arial"/>
+                <a:cs typeface="Arial"/>
+                <a:sym typeface="Arial"/>
+              </a:defRPr>
+            </a:lvl4pPr>
+            <a:lvl5pPr marR="0" lvl="4" algn="l" rtl="0">
+              <a:lnSpc>
+                <a:spcPct val="100000"/>
+              </a:lnSpc>
+              <a:spcBef>
+                <a:spcPts val="0"/>
+              </a:spcBef>
+              <a:spcAft>
+                <a:spcPts val="0"/>
+              </a:spcAft>
+              <a:buClr>
+                <a:schemeClr val="dk1"/>
+              </a:buClr>
+              <a:buSzPts val="2800"/>
+              <a:buFont typeface="Arial"/>
+              <a:buNone/>
+              <a:defRPr sz="2800" b="0" i="0" u="none" strike="noStrike" cap="none">
+                <a:solidFill>
+                  <a:schemeClr val="dk1"/>
+                </a:solidFill>
+                <a:latin typeface="Arial"/>
+                <a:ea typeface="Arial"/>
+                <a:cs typeface="Arial"/>
+                <a:sym typeface="Arial"/>
+              </a:defRPr>
+            </a:lvl5pPr>
+            <a:lvl6pPr marR="0" lvl="5" algn="l" rtl="0">
+              <a:lnSpc>
+                <a:spcPct val="100000"/>
+              </a:lnSpc>
+              <a:spcBef>
+                <a:spcPts val="0"/>
+              </a:spcBef>
+              <a:spcAft>
+                <a:spcPts val="0"/>
+              </a:spcAft>
+              <a:buClr>
+                <a:schemeClr val="dk1"/>
+              </a:buClr>
+              <a:buSzPts val="2800"/>
+              <a:buFont typeface="Arial"/>
+              <a:buNone/>
+              <a:defRPr sz="2800" b="0" i="0" u="none" strike="noStrike" cap="none">
+                <a:solidFill>
+                  <a:schemeClr val="dk1"/>
+                </a:solidFill>
+                <a:latin typeface="Arial"/>
+                <a:ea typeface="Arial"/>
+                <a:cs typeface="Arial"/>
+                <a:sym typeface="Arial"/>
+              </a:defRPr>
+            </a:lvl6pPr>
+            <a:lvl7pPr marR="0" lvl="6" algn="l" rtl="0">
+              <a:lnSpc>
+                <a:spcPct val="100000"/>
+              </a:lnSpc>
+              <a:spcBef>
+                <a:spcPts val="0"/>
+              </a:spcBef>
+              <a:spcAft>
+                <a:spcPts val="0"/>
+              </a:spcAft>
+              <a:buClr>
+                <a:schemeClr val="dk1"/>
+              </a:buClr>
+              <a:buSzPts val="2800"/>
+              <a:buFont typeface="Arial"/>
+              <a:buNone/>
+              <a:defRPr sz="2800" b="0" i="0" u="none" strike="noStrike" cap="none">
+                <a:solidFill>
+                  <a:schemeClr val="dk1"/>
+                </a:solidFill>
+                <a:latin typeface="Arial"/>
+                <a:ea typeface="Arial"/>
+                <a:cs typeface="Arial"/>
+                <a:sym typeface="Arial"/>
+              </a:defRPr>
+            </a:lvl7pPr>
+            <a:lvl8pPr marR="0" lvl="7" algn="l" rtl="0">
+              <a:lnSpc>
+                <a:spcPct val="100000"/>
+              </a:lnSpc>
+              <a:spcBef>
+                <a:spcPts val="0"/>
+              </a:spcBef>
+              <a:spcAft>
+                <a:spcPts val="0"/>
+              </a:spcAft>
+              <a:buClr>
+                <a:schemeClr val="dk1"/>
+              </a:buClr>
+              <a:buSzPts val="2800"/>
+              <a:buFont typeface="Arial"/>
+              <a:buNone/>
+              <a:defRPr sz="2800" b="0" i="0" u="none" strike="noStrike" cap="none">
+                <a:solidFill>
+                  <a:schemeClr val="dk1"/>
+                </a:solidFill>
+                <a:latin typeface="Arial"/>
+                <a:ea typeface="Arial"/>
+                <a:cs typeface="Arial"/>
+                <a:sym typeface="Arial"/>
+              </a:defRPr>
+            </a:lvl8pPr>
+            <a:lvl9pPr marR="0" lvl="8" algn="l" rtl="0">
+              <a:lnSpc>
+                <a:spcPct val="100000"/>
+              </a:lnSpc>
+              <a:spcBef>
+                <a:spcPts val="0"/>
+              </a:spcBef>
+              <a:spcAft>
+                <a:spcPts val="0"/>
+              </a:spcAft>
+              <a:buClr>
+                <a:schemeClr val="dk1"/>
+              </a:buClr>
+              <a:buSzPts val="2800"/>
+              <a:buFont typeface="Arial"/>
+              <a:buNone/>
+              <a:defRPr sz="2800" b="0" i="0" u="none" strike="noStrike" cap="none">
+                <a:solidFill>
+                  <a:schemeClr val="dk1"/>
+                </a:solidFill>
+                <a:latin typeface="Arial"/>
+                <a:ea typeface="Arial"/>
+                <a:cs typeface="Arial"/>
+                <a:sym typeface="Arial"/>
+              </a:defRPr>
+            </a:lvl9pPr>
+          </a:lstStyle>
+          <a:p>
+            <a:pPr algn="r"/>
+            <a:r>
+              <a:rPr lang="en-US" dirty="0" smtClean="0">
+                <a:latin typeface="Comfortaa" panose="020B0604020202020204" charset="0"/>
+              </a:rPr>
+              <a:t>30.07</a:t>
+            </a:r>
+            <a:endParaRPr lang="ru-RU" dirty="0">
+              <a:latin typeface="Comfortaa" panose="020B0604020202020204" charset="0"/>
+            </a:endParaRPr>
+          </a:p>
+        </p:txBody>
+      </p:sp>
+    </p:spTree>
+    <p:extLst>
+      <p:ext uri="{BB962C8B-B14F-4D97-AF65-F5344CB8AC3E}">
+        <p14:creationId xmlns:p14="http://schemas.microsoft.com/office/powerpoint/2010/main" val="871112610"/>
+      </p:ext>
+    </p:extLst>
+  </p:cSld>
+  <p:clrMapOvr>
+    <a:masterClrMapping/>
+  </p:clrMapOvr>
+</p:sld>
+</file>
+
+<file path=ppt/slides/slide12.xml><?xml version="1.0" encoding="utf-8"?>
+<p:sld xmlns:a="http://schemas.openxmlformats.org/drawingml/2006/main" xmlns:r="http://schemas.openxmlformats.org/officeDocument/2006/relationships" xmlns:p="http://schemas.openxmlformats.org/presentationml/2006/main">
+  <p:cSld>
+    <p:spTree>
+      <p:nvGrpSpPr>
+        <p:cNvPr id="1" name=""/>
+        <p:cNvGrpSpPr/>
+        <p:nvPr/>
+      </p:nvGrpSpPr>
+      <p:grpSpPr>
+        <a:xfrm>
+          <a:off x="0" y="0"/>
+          <a:ext cx="0" cy="0"/>
+          <a:chOff x="0" y="0"/>
+          <a:chExt cx="0" cy="0"/>
+        </a:xfrm>
+      </p:grpSpPr>
+      <p:sp>
+        <p:nvSpPr>
+          <p:cNvPr id="2" name="Заголовок 1"/>
+          <p:cNvSpPr>
+            <a:spLocks noGrp="1"/>
+          </p:cNvSpPr>
+          <p:nvPr>
+            <p:ph type="title"/>
+          </p:nvPr>
+        </p:nvSpPr>
+        <p:spPr>
+          <a:xfrm>
+            <a:off x="311700" y="445025"/>
+            <a:ext cx="2073990" cy="572700"/>
+          </a:xfrm>
+        </p:spPr>
+        <p:txBody>
+          <a:bodyPr>
+            <a:normAutofit fontScale="90000"/>
+          </a:bodyPr>
+          <a:lstStyle/>
+          <a:p>
+            <a:r>
+              <a:rPr lang="en-US" dirty="0">
+                <a:latin typeface="Comfortaa" panose="020B0604020202020204" charset="0"/>
+              </a:rPr>
+              <a:t>2</a:t>
+            </a:r>
+            <a:r>
+              <a:rPr lang="en-US" dirty="0" smtClean="0">
+                <a:latin typeface="Comfortaa" panose="020B0604020202020204" charset="0"/>
+              </a:rPr>
+              <a:t>. Data</a:t>
+            </a:r>
+            <a:endParaRPr lang="ru-RU" dirty="0">
+              <a:latin typeface="Comfortaa" panose="020B0604020202020204" charset="0"/>
+            </a:endParaRPr>
+          </a:p>
+        </p:txBody>
+      </p:sp>
+      <p:sp>
+        <p:nvSpPr>
+          <p:cNvPr id="3" name="Текст 2"/>
+          <p:cNvSpPr>
+            <a:spLocks noGrp="1"/>
+          </p:cNvSpPr>
+          <p:nvPr>
+            <p:ph type="body" idx="1"/>
+          </p:nvPr>
+        </p:nvSpPr>
+        <p:spPr/>
+        <p:txBody>
+          <a:bodyPr/>
+          <a:lstStyle/>
+          <a:p>
+            <a:pPr>
+              <a:buFontTx/>
+              <a:buChar char="-"/>
+            </a:pPr>
+            <a:r>
+              <a:rPr lang="en-US" dirty="0" smtClean="0">
+                <a:solidFill>
+                  <a:schemeClr val="tx1"/>
+                </a:solidFill>
+                <a:latin typeface="Roboto" panose="020B0604020202020204" charset="0"/>
+                <a:ea typeface="Roboto" panose="020B0604020202020204" charset="0"/>
+              </a:rPr>
+              <a:t>Candidates </a:t>
+            </a:r>
+            <a:r>
+              <a:rPr lang="en-US" dirty="0">
+                <a:solidFill>
+                  <a:schemeClr val="tx1"/>
+                </a:solidFill>
+                <a:latin typeface="Roboto" panose="020B0604020202020204" charset="0"/>
+                <a:ea typeface="Roboto" panose="020B0604020202020204" charset="0"/>
+              </a:rPr>
+              <a:t>&amp; Description: </a:t>
+            </a:r>
+            <a:r>
+              <a:rPr lang="en-US" dirty="0">
+                <a:solidFill>
+                  <a:schemeClr val="tx1"/>
+                </a:solidFill>
+                <a:latin typeface="Roboto" panose="020B0604020202020204" charset="0"/>
+                <a:ea typeface="Roboto" panose="020B0604020202020204" charset="0"/>
+                <a:hlinkClick r:id="rId2"/>
+              </a:rPr>
+              <a:t>https://</a:t>
+            </a:r>
+            <a:r>
+              <a:rPr lang="en-US" dirty="0" smtClean="0">
+                <a:solidFill>
+                  <a:schemeClr val="tx1"/>
+                </a:solidFill>
+                <a:latin typeface="Roboto" panose="020B0604020202020204" charset="0"/>
+                <a:ea typeface="Roboto" panose="020B0604020202020204" charset="0"/>
+                <a:hlinkClick r:id="rId2"/>
+              </a:rPr>
+              <a:t>www.notion.so/2ec43a57e8ca4d03bb355b8f26f4319e?v=35aacddee74c47f2babd97ba957bcd5d</a:t>
+            </a:r>
+            <a:endParaRPr lang="en-US" dirty="0" smtClean="0">
+              <a:solidFill>
+                <a:schemeClr val="tx1"/>
+              </a:solidFill>
+              <a:latin typeface="Roboto" panose="020B0604020202020204" charset="0"/>
+              <a:ea typeface="Roboto" panose="020B0604020202020204" charset="0"/>
+            </a:endParaRPr>
+          </a:p>
+          <a:p>
+            <a:pPr>
+              <a:buFontTx/>
+              <a:buChar char="-"/>
+            </a:pPr>
+            <a:r>
+              <a:rPr lang="en-US" dirty="0">
+                <a:solidFill>
+                  <a:schemeClr val="tx1"/>
+                </a:solidFill>
+                <a:latin typeface="Roboto" panose="020B0604020202020204" charset="0"/>
+                <a:ea typeface="Roboto" panose="020B0604020202020204" charset="0"/>
+              </a:rPr>
+              <a:t>Selected: </a:t>
+            </a:r>
+            <a:r>
+              <a:rPr lang="en-US" dirty="0">
+                <a:solidFill>
+                  <a:schemeClr val="tx1"/>
+                </a:solidFill>
+                <a:latin typeface="Roboto" panose="020B0604020202020204" charset="0"/>
+                <a:ea typeface="Roboto" panose="020B0604020202020204" charset="0"/>
+                <a:hlinkClick r:id="rId3"/>
+              </a:rPr>
+              <a:t>https://</a:t>
+            </a:r>
+            <a:r>
+              <a:rPr lang="en-US" dirty="0" smtClean="0">
+                <a:solidFill>
+                  <a:schemeClr val="tx1"/>
+                </a:solidFill>
+                <a:latin typeface="Roboto" panose="020B0604020202020204" charset="0"/>
+                <a:ea typeface="Roboto" panose="020B0604020202020204" charset="0"/>
+                <a:hlinkClick r:id="rId3"/>
+              </a:rPr>
+              <a:t>www.kaggle.com/teertha/personal-loan-modeling</a:t>
+            </a:r>
+            <a:endParaRPr lang="en-US" dirty="0">
+              <a:solidFill>
+                <a:schemeClr val="tx1"/>
+              </a:solidFill>
+              <a:latin typeface="Roboto" panose="020B0604020202020204" charset="0"/>
+              <a:ea typeface="Roboto" panose="020B0604020202020204" charset="0"/>
+            </a:endParaRPr>
+          </a:p>
+          <a:p>
+            <a:pPr>
+              <a:buFontTx/>
+              <a:buChar char="-"/>
+            </a:pPr>
+            <a:endParaRPr lang="ru-RU" dirty="0">
+              <a:solidFill>
+                <a:schemeClr val="tx1"/>
+              </a:solidFill>
+              <a:latin typeface="Roboto" panose="020B0604020202020204" charset="0"/>
+              <a:ea typeface="Roboto" panose="020B0604020202020204" charset="0"/>
+            </a:endParaRPr>
+          </a:p>
+        </p:txBody>
+      </p:sp>
+      <p:sp>
+        <p:nvSpPr>
+          <p:cNvPr id="4" name="Заголовок 1"/>
+          <p:cNvSpPr txBox="1">
+            <a:spLocks/>
+          </p:cNvSpPr>
+          <p:nvPr/>
+        </p:nvSpPr>
+        <p:spPr>
+          <a:xfrm>
+            <a:off x="6758310" y="445025"/>
+            <a:ext cx="2073990" cy="572700"/>
+          </a:xfrm>
+          <a:prstGeom prst="rect">
+            <a:avLst/>
+          </a:prstGeom>
+          <a:noFill/>
+          <a:ln>
+            <a:noFill/>
+          </a:ln>
+        </p:spPr>
+        <p:txBody>
+          <a:bodyPr spcFirstLastPara="1" wrap="square" lIns="91425" tIns="91425" rIns="91425" bIns="91425" anchor="t" anchorCtr="0">
+            <a:normAutofit fontScale="90000"/>
+          </a:bodyPr>
+          <a:lstStyle>
+            <a:defPPr marR="0" lvl="0" algn="l" rtl="0">
+              <a:lnSpc>
+                <a:spcPct val="100000"/>
+              </a:lnSpc>
+              <a:spcBef>
+                <a:spcPts val="0"/>
+              </a:spcBef>
+              <a:spcAft>
+                <a:spcPts val="0"/>
+              </a:spcAft>
+            </a:defPPr>
+            <a:lvl1pPr marR="0" lvl="0" algn="l" rtl="0">
+              <a:lnSpc>
+                <a:spcPct val="100000"/>
+              </a:lnSpc>
+              <a:spcBef>
+                <a:spcPts val="0"/>
+              </a:spcBef>
+              <a:spcAft>
+                <a:spcPts val="0"/>
+              </a:spcAft>
+              <a:buClr>
+                <a:schemeClr val="dk1"/>
+              </a:buClr>
+              <a:buSzPts val="2800"/>
+              <a:buFont typeface="Arial"/>
+              <a:buNone/>
+              <a:defRPr sz="2800" b="0" i="0" u="none" strike="noStrike" cap="none">
+                <a:solidFill>
+                  <a:schemeClr val="dk1"/>
+                </a:solidFill>
+                <a:latin typeface="Arial"/>
+                <a:ea typeface="Arial"/>
+                <a:cs typeface="Arial"/>
+                <a:sym typeface="Arial"/>
+              </a:defRPr>
+            </a:lvl1pPr>
+            <a:lvl2pPr marR="0" lvl="1" algn="l" rtl="0">
+              <a:lnSpc>
+                <a:spcPct val="100000"/>
+              </a:lnSpc>
+              <a:spcBef>
+                <a:spcPts val="0"/>
+              </a:spcBef>
+              <a:spcAft>
+                <a:spcPts val="0"/>
+              </a:spcAft>
+              <a:buClr>
+                <a:schemeClr val="dk1"/>
+              </a:buClr>
+              <a:buSzPts val="2800"/>
+              <a:buFont typeface="Arial"/>
+              <a:buNone/>
+              <a:defRPr sz="2800" b="0" i="0" u="none" strike="noStrike" cap="none">
+                <a:solidFill>
+                  <a:schemeClr val="dk1"/>
+                </a:solidFill>
+                <a:latin typeface="Arial"/>
+                <a:ea typeface="Arial"/>
+                <a:cs typeface="Arial"/>
+                <a:sym typeface="Arial"/>
+              </a:defRPr>
+            </a:lvl2pPr>
+            <a:lvl3pPr marR="0" lvl="2" algn="l" rtl="0">
+              <a:lnSpc>
+                <a:spcPct val="100000"/>
+              </a:lnSpc>
+              <a:spcBef>
+                <a:spcPts val="0"/>
+              </a:spcBef>
+              <a:spcAft>
+                <a:spcPts val="0"/>
+              </a:spcAft>
+              <a:buClr>
+                <a:schemeClr val="dk1"/>
+              </a:buClr>
+              <a:buSzPts val="2800"/>
+              <a:buFont typeface="Arial"/>
+              <a:buNone/>
+              <a:defRPr sz="2800" b="0" i="0" u="none" strike="noStrike" cap="none">
+                <a:solidFill>
+                  <a:schemeClr val="dk1"/>
+                </a:solidFill>
+                <a:latin typeface="Arial"/>
+                <a:ea typeface="Arial"/>
+                <a:cs typeface="Arial"/>
+                <a:sym typeface="Arial"/>
+              </a:defRPr>
+            </a:lvl3pPr>
+            <a:lvl4pPr marR="0" lvl="3" algn="l" rtl="0">
+              <a:lnSpc>
+                <a:spcPct val="100000"/>
+              </a:lnSpc>
+              <a:spcBef>
+                <a:spcPts val="0"/>
+              </a:spcBef>
+              <a:spcAft>
+                <a:spcPts val="0"/>
+              </a:spcAft>
+              <a:buClr>
+                <a:schemeClr val="dk1"/>
+              </a:buClr>
+              <a:buSzPts val="2800"/>
+              <a:buFont typeface="Arial"/>
+              <a:buNone/>
+              <a:defRPr sz="2800" b="0" i="0" u="none" strike="noStrike" cap="none">
+                <a:solidFill>
+                  <a:schemeClr val="dk1"/>
+                </a:solidFill>
+                <a:latin typeface="Arial"/>
+                <a:ea typeface="Arial"/>
+                <a:cs typeface="Arial"/>
+                <a:sym typeface="Arial"/>
+              </a:defRPr>
+            </a:lvl4pPr>
+            <a:lvl5pPr marR="0" lvl="4" algn="l" rtl="0">
+              <a:lnSpc>
+                <a:spcPct val="100000"/>
+              </a:lnSpc>
+              <a:spcBef>
+                <a:spcPts val="0"/>
+              </a:spcBef>
+              <a:spcAft>
+                <a:spcPts val="0"/>
+              </a:spcAft>
+              <a:buClr>
+                <a:schemeClr val="dk1"/>
+              </a:buClr>
+              <a:buSzPts val="2800"/>
+              <a:buFont typeface="Arial"/>
+              <a:buNone/>
+              <a:defRPr sz="2800" b="0" i="0" u="none" strike="noStrike" cap="none">
+                <a:solidFill>
+                  <a:schemeClr val="dk1"/>
+                </a:solidFill>
+                <a:latin typeface="Arial"/>
+                <a:ea typeface="Arial"/>
+                <a:cs typeface="Arial"/>
+                <a:sym typeface="Arial"/>
+              </a:defRPr>
+            </a:lvl5pPr>
+            <a:lvl6pPr marR="0" lvl="5" algn="l" rtl="0">
+              <a:lnSpc>
+                <a:spcPct val="100000"/>
+              </a:lnSpc>
+              <a:spcBef>
+                <a:spcPts val="0"/>
+              </a:spcBef>
+              <a:spcAft>
+                <a:spcPts val="0"/>
+              </a:spcAft>
+              <a:buClr>
+                <a:schemeClr val="dk1"/>
+              </a:buClr>
+              <a:buSzPts val="2800"/>
+              <a:buFont typeface="Arial"/>
+              <a:buNone/>
+              <a:defRPr sz="2800" b="0" i="0" u="none" strike="noStrike" cap="none">
+                <a:solidFill>
+                  <a:schemeClr val="dk1"/>
+                </a:solidFill>
+                <a:latin typeface="Arial"/>
+                <a:ea typeface="Arial"/>
+                <a:cs typeface="Arial"/>
+                <a:sym typeface="Arial"/>
+              </a:defRPr>
+            </a:lvl6pPr>
+            <a:lvl7pPr marR="0" lvl="6" algn="l" rtl="0">
+              <a:lnSpc>
+                <a:spcPct val="100000"/>
+              </a:lnSpc>
+              <a:spcBef>
+                <a:spcPts val="0"/>
+              </a:spcBef>
+              <a:spcAft>
+                <a:spcPts val="0"/>
+              </a:spcAft>
+              <a:buClr>
+                <a:schemeClr val="dk1"/>
+              </a:buClr>
+              <a:buSzPts val="2800"/>
+              <a:buFont typeface="Arial"/>
+              <a:buNone/>
+              <a:defRPr sz="2800" b="0" i="0" u="none" strike="noStrike" cap="none">
+                <a:solidFill>
+                  <a:schemeClr val="dk1"/>
+                </a:solidFill>
+                <a:latin typeface="Arial"/>
+                <a:ea typeface="Arial"/>
+                <a:cs typeface="Arial"/>
+                <a:sym typeface="Arial"/>
+              </a:defRPr>
+            </a:lvl7pPr>
+            <a:lvl8pPr marR="0" lvl="7" algn="l" rtl="0">
+              <a:lnSpc>
+                <a:spcPct val="100000"/>
+              </a:lnSpc>
+              <a:spcBef>
+                <a:spcPts val="0"/>
+              </a:spcBef>
+              <a:spcAft>
+                <a:spcPts val="0"/>
+              </a:spcAft>
+              <a:buClr>
+                <a:schemeClr val="dk1"/>
+              </a:buClr>
+              <a:buSzPts val="2800"/>
+              <a:buFont typeface="Arial"/>
+              <a:buNone/>
+              <a:defRPr sz="2800" b="0" i="0" u="none" strike="noStrike" cap="none">
+                <a:solidFill>
+                  <a:schemeClr val="dk1"/>
+                </a:solidFill>
+                <a:latin typeface="Arial"/>
+                <a:ea typeface="Arial"/>
+                <a:cs typeface="Arial"/>
+                <a:sym typeface="Arial"/>
+              </a:defRPr>
+            </a:lvl8pPr>
+            <a:lvl9pPr marR="0" lvl="8" algn="l" rtl="0">
+              <a:lnSpc>
+                <a:spcPct val="100000"/>
+              </a:lnSpc>
+              <a:spcBef>
+                <a:spcPts val="0"/>
+              </a:spcBef>
+              <a:spcAft>
+                <a:spcPts val="0"/>
+              </a:spcAft>
+              <a:buClr>
+                <a:schemeClr val="dk1"/>
+              </a:buClr>
+              <a:buSzPts val="2800"/>
+              <a:buFont typeface="Arial"/>
+              <a:buNone/>
+              <a:defRPr sz="2800" b="0" i="0" u="none" strike="noStrike" cap="none">
+                <a:solidFill>
+                  <a:schemeClr val="dk1"/>
+                </a:solidFill>
+                <a:latin typeface="Arial"/>
+                <a:ea typeface="Arial"/>
+                <a:cs typeface="Arial"/>
+                <a:sym typeface="Arial"/>
+              </a:defRPr>
+            </a:lvl9pPr>
+          </a:lstStyle>
+          <a:p>
+            <a:pPr algn="r"/>
+            <a:r>
+              <a:rPr lang="en-US" dirty="0" smtClean="0">
+                <a:latin typeface="Comfortaa" panose="020B0604020202020204" charset="0"/>
+              </a:rPr>
+              <a:t>31.07 - 04.08</a:t>
+            </a:r>
+            <a:endParaRPr lang="ru-RU" dirty="0">
+              <a:latin typeface="Comfortaa" panose="020B0604020202020204" charset="0"/>
+            </a:endParaRPr>
+          </a:p>
+        </p:txBody>
+      </p:sp>
+    </p:spTree>
+    <p:extLst>
+      <p:ext uri="{BB962C8B-B14F-4D97-AF65-F5344CB8AC3E}">
+        <p14:creationId xmlns:p14="http://schemas.microsoft.com/office/powerpoint/2010/main" val="4008281766"/>
+      </p:ext>
+    </p:extLst>
+  </p:cSld>
+  <p:clrMapOvr>
+    <a:masterClrMapping/>
+  </p:clrMapOvr>
+</p:sld>
+</file>
+
+<file path=ppt/slides/slide13.xml><?xml version="1.0" encoding="utf-8"?>
+<p:sld xmlns:a="http://schemas.openxmlformats.org/drawingml/2006/main" xmlns:r="http://schemas.openxmlformats.org/officeDocument/2006/relationships" xmlns:p="http://schemas.openxmlformats.org/presentationml/2006/main">
+  <p:cSld>
+    <p:spTree>
+      <p:nvGrpSpPr>
+        <p:cNvPr id="1" name=""/>
+        <p:cNvGrpSpPr/>
+        <p:nvPr/>
+      </p:nvGrpSpPr>
+      <p:grpSpPr>
+        <a:xfrm>
+          <a:off x="0" y="0"/>
+          <a:ext cx="0" cy="0"/>
+          <a:chOff x="0" y="0"/>
+          <a:chExt cx="0" cy="0"/>
+        </a:xfrm>
+      </p:grpSpPr>
+      <p:sp>
+        <p:nvSpPr>
+          <p:cNvPr id="2" name="Заголовок 1"/>
+          <p:cNvSpPr>
+            <a:spLocks noGrp="1"/>
+          </p:cNvSpPr>
+          <p:nvPr>
+            <p:ph type="title"/>
+          </p:nvPr>
+        </p:nvSpPr>
+        <p:spPr>
+          <a:xfrm>
+            <a:off x="311700" y="445025"/>
+            <a:ext cx="4609550" cy="572700"/>
+          </a:xfrm>
+        </p:spPr>
+        <p:txBody>
+          <a:bodyPr>
+            <a:normAutofit fontScale="90000"/>
+          </a:bodyPr>
+          <a:lstStyle/>
+          <a:p>
+            <a:r>
+              <a:rPr lang="en-US" dirty="0" smtClean="0">
+                <a:latin typeface="Comfortaa" panose="020B0604020202020204" charset="0"/>
+              </a:rPr>
+              <a:t>3-4. Goals &amp; baseline</a:t>
+            </a:r>
+            <a:endParaRPr lang="ru-RU" dirty="0">
+              <a:latin typeface="Comfortaa" panose="020B0604020202020204" charset="0"/>
+            </a:endParaRPr>
+          </a:p>
+        </p:txBody>
+      </p:sp>
+      <p:sp>
+        <p:nvSpPr>
+          <p:cNvPr id="3" name="Текст 2"/>
+          <p:cNvSpPr>
+            <a:spLocks noGrp="1"/>
+          </p:cNvSpPr>
+          <p:nvPr>
+            <p:ph type="body" idx="1"/>
+          </p:nvPr>
+        </p:nvSpPr>
+        <p:spPr/>
+        <p:txBody>
+          <a:bodyPr/>
+          <a:lstStyle/>
+          <a:p>
+            <a:pPr>
+              <a:buFontTx/>
+              <a:buChar char="-"/>
+            </a:pPr>
+            <a:r>
+              <a:rPr lang="en-US" dirty="0" smtClean="0">
+                <a:solidFill>
+                  <a:schemeClr val="tx1"/>
+                </a:solidFill>
+                <a:latin typeface="Roboto" panose="020B0604020202020204" charset="0"/>
+                <a:ea typeface="Roboto" panose="020B0604020202020204" charset="0"/>
+              </a:rPr>
+              <a:t>Baseline: KNN, All normalized features  - Id, ZIP Code ~ 0.95</a:t>
+            </a:r>
+          </a:p>
+          <a:p>
+            <a:pPr>
+              <a:buFontTx/>
+              <a:buChar char="-"/>
+            </a:pPr>
+            <a:r>
+              <a:rPr lang="en-US" dirty="0" smtClean="0">
+                <a:solidFill>
+                  <a:schemeClr val="tx1"/>
+                </a:solidFill>
+                <a:latin typeface="Roboto" panose="020B0604020202020204" charset="0"/>
+                <a:ea typeface="Roboto" panose="020B0604020202020204" charset="0"/>
+              </a:rPr>
+              <a:t>Metrics: F1, ROC_AUC</a:t>
+            </a:r>
+          </a:p>
+        </p:txBody>
+      </p:sp>
+      <p:sp>
+        <p:nvSpPr>
+          <p:cNvPr id="4" name="Заголовок 1"/>
+          <p:cNvSpPr txBox="1">
+            <a:spLocks/>
+          </p:cNvSpPr>
+          <p:nvPr/>
+        </p:nvSpPr>
+        <p:spPr>
+          <a:xfrm>
+            <a:off x="6642100" y="445025"/>
+            <a:ext cx="2190200" cy="572700"/>
+          </a:xfrm>
+          <a:prstGeom prst="rect">
+            <a:avLst/>
+          </a:prstGeom>
+          <a:noFill/>
+          <a:ln>
+            <a:noFill/>
+          </a:ln>
+        </p:spPr>
+        <p:txBody>
+          <a:bodyPr spcFirstLastPara="1" wrap="square" lIns="91425" tIns="91425" rIns="91425" bIns="91425" anchor="t" anchorCtr="0">
+            <a:normAutofit fontScale="90000"/>
+          </a:bodyPr>
+          <a:lstStyle>
+            <a:defPPr marR="0" lvl="0" algn="l" rtl="0">
+              <a:lnSpc>
+                <a:spcPct val="100000"/>
+              </a:lnSpc>
+              <a:spcBef>
+                <a:spcPts val="0"/>
+              </a:spcBef>
+              <a:spcAft>
+                <a:spcPts val="0"/>
+              </a:spcAft>
+            </a:defPPr>
+            <a:lvl1pPr marR="0" lvl="0" algn="l" rtl="0">
+              <a:lnSpc>
+                <a:spcPct val="100000"/>
+              </a:lnSpc>
+              <a:spcBef>
+                <a:spcPts val="0"/>
+              </a:spcBef>
+              <a:spcAft>
+                <a:spcPts val="0"/>
+              </a:spcAft>
+              <a:buClr>
+                <a:schemeClr val="dk1"/>
+              </a:buClr>
+              <a:buSzPts val="2800"/>
+              <a:buFont typeface="Arial"/>
+              <a:buNone/>
+              <a:defRPr sz="2800" b="0" i="0" u="none" strike="noStrike" cap="none">
+                <a:solidFill>
+                  <a:schemeClr val="dk1"/>
+                </a:solidFill>
+                <a:latin typeface="Arial"/>
+                <a:ea typeface="Arial"/>
+                <a:cs typeface="Arial"/>
+                <a:sym typeface="Arial"/>
+              </a:defRPr>
+            </a:lvl1pPr>
+            <a:lvl2pPr marR="0" lvl="1" algn="l" rtl="0">
+              <a:lnSpc>
+                <a:spcPct val="100000"/>
+              </a:lnSpc>
+              <a:spcBef>
+                <a:spcPts val="0"/>
+              </a:spcBef>
+              <a:spcAft>
+                <a:spcPts val="0"/>
+              </a:spcAft>
+              <a:buClr>
+                <a:schemeClr val="dk1"/>
+              </a:buClr>
+              <a:buSzPts val="2800"/>
+              <a:buFont typeface="Arial"/>
+              <a:buNone/>
+              <a:defRPr sz="2800" b="0" i="0" u="none" strike="noStrike" cap="none">
+                <a:solidFill>
+                  <a:schemeClr val="dk1"/>
+                </a:solidFill>
+                <a:latin typeface="Arial"/>
+                <a:ea typeface="Arial"/>
+                <a:cs typeface="Arial"/>
+                <a:sym typeface="Arial"/>
+              </a:defRPr>
+            </a:lvl2pPr>
+            <a:lvl3pPr marR="0" lvl="2" algn="l" rtl="0">
+              <a:lnSpc>
+                <a:spcPct val="100000"/>
+              </a:lnSpc>
+              <a:spcBef>
+                <a:spcPts val="0"/>
+              </a:spcBef>
+              <a:spcAft>
+                <a:spcPts val="0"/>
+              </a:spcAft>
+              <a:buClr>
+                <a:schemeClr val="dk1"/>
+              </a:buClr>
+              <a:buSzPts val="2800"/>
+              <a:buFont typeface="Arial"/>
+              <a:buNone/>
+              <a:defRPr sz="2800" b="0" i="0" u="none" strike="noStrike" cap="none">
+                <a:solidFill>
+                  <a:schemeClr val="dk1"/>
+                </a:solidFill>
+                <a:latin typeface="Arial"/>
+                <a:ea typeface="Arial"/>
+                <a:cs typeface="Arial"/>
+                <a:sym typeface="Arial"/>
+              </a:defRPr>
+            </a:lvl3pPr>
+            <a:lvl4pPr marR="0" lvl="3" algn="l" rtl="0">
+              <a:lnSpc>
+                <a:spcPct val="100000"/>
+              </a:lnSpc>
+              <a:spcBef>
+                <a:spcPts val="0"/>
+              </a:spcBef>
+              <a:spcAft>
+                <a:spcPts val="0"/>
+              </a:spcAft>
+              <a:buClr>
+                <a:schemeClr val="dk1"/>
+              </a:buClr>
+              <a:buSzPts val="2800"/>
+              <a:buFont typeface="Arial"/>
+              <a:buNone/>
+              <a:defRPr sz="2800" b="0" i="0" u="none" strike="noStrike" cap="none">
+                <a:solidFill>
+                  <a:schemeClr val="dk1"/>
+                </a:solidFill>
+                <a:latin typeface="Arial"/>
+                <a:ea typeface="Arial"/>
+                <a:cs typeface="Arial"/>
+                <a:sym typeface="Arial"/>
+              </a:defRPr>
+            </a:lvl4pPr>
+            <a:lvl5pPr marR="0" lvl="4" algn="l" rtl="0">
+              <a:lnSpc>
+                <a:spcPct val="100000"/>
+              </a:lnSpc>
+              <a:spcBef>
+                <a:spcPts val="0"/>
+              </a:spcBef>
+              <a:spcAft>
+                <a:spcPts val="0"/>
+              </a:spcAft>
+              <a:buClr>
+                <a:schemeClr val="dk1"/>
+              </a:buClr>
+              <a:buSzPts val="2800"/>
+              <a:buFont typeface="Arial"/>
+              <a:buNone/>
+              <a:defRPr sz="2800" b="0" i="0" u="none" strike="noStrike" cap="none">
+                <a:solidFill>
+                  <a:schemeClr val="dk1"/>
+                </a:solidFill>
+                <a:latin typeface="Arial"/>
+                <a:ea typeface="Arial"/>
+                <a:cs typeface="Arial"/>
+                <a:sym typeface="Arial"/>
+              </a:defRPr>
+            </a:lvl5pPr>
+            <a:lvl6pPr marR="0" lvl="5" algn="l" rtl="0">
+              <a:lnSpc>
+                <a:spcPct val="100000"/>
+              </a:lnSpc>
+              <a:spcBef>
+                <a:spcPts val="0"/>
+              </a:spcBef>
+              <a:spcAft>
+                <a:spcPts val="0"/>
+              </a:spcAft>
+              <a:buClr>
+                <a:schemeClr val="dk1"/>
+              </a:buClr>
+              <a:buSzPts val="2800"/>
+              <a:buFont typeface="Arial"/>
+              <a:buNone/>
+              <a:defRPr sz="2800" b="0" i="0" u="none" strike="noStrike" cap="none">
+                <a:solidFill>
+                  <a:schemeClr val="dk1"/>
+                </a:solidFill>
+                <a:latin typeface="Arial"/>
+                <a:ea typeface="Arial"/>
+                <a:cs typeface="Arial"/>
+                <a:sym typeface="Arial"/>
+              </a:defRPr>
+            </a:lvl6pPr>
+            <a:lvl7pPr marR="0" lvl="6" algn="l" rtl="0">
+              <a:lnSpc>
+                <a:spcPct val="100000"/>
+              </a:lnSpc>
+              <a:spcBef>
+                <a:spcPts val="0"/>
+              </a:spcBef>
+              <a:spcAft>
+                <a:spcPts val="0"/>
+              </a:spcAft>
+              <a:buClr>
+                <a:schemeClr val="dk1"/>
+              </a:buClr>
+              <a:buSzPts val="2800"/>
+              <a:buFont typeface="Arial"/>
+              <a:buNone/>
+              <a:defRPr sz="2800" b="0" i="0" u="none" strike="noStrike" cap="none">
+                <a:solidFill>
+                  <a:schemeClr val="dk1"/>
+                </a:solidFill>
+                <a:latin typeface="Arial"/>
+                <a:ea typeface="Arial"/>
+                <a:cs typeface="Arial"/>
+                <a:sym typeface="Arial"/>
+              </a:defRPr>
+            </a:lvl7pPr>
+            <a:lvl8pPr marR="0" lvl="7" algn="l" rtl="0">
+              <a:lnSpc>
+                <a:spcPct val="100000"/>
+              </a:lnSpc>
+              <a:spcBef>
+                <a:spcPts val="0"/>
+              </a:spcBef>
+              <a:spcAft>
+                <a:spcPts val="0"/>
+              </a:spcAft>
+              <a:buClr>
+                <a:schemeClr val="dk1"/>
+              </a:buClr>
+              <a:buSzPts val="2800"/>
+              <a:buFont typeface="Arial"/>
+              <a:buNone/>
+              <a:defRPr sz="2800" b="0" i="0" u="none" strike="noStrike" cap="none">
+                <a:solidFill>
+                  <a:schemeClr val="dk1"/>
+                </a:solidFill>
+                <a:latin typeface="Arial"/>
+                <a:ea typeface="Arial"/>
+                <a:cs typeface="Arial"/>
+                <a:sym typeface="Arial"/>
+              </a:defRPr>
+            </a:lvl8pPr>
+            <a:lvl9pPr marR="0" lvl="8" algn="l" rtl="0">
+              <a:lnSpc>
+                <a:spcPct val="100000"/>
+              </a:lnSpc>
+              <a:spcBef>
+                <a:spcPts val="0"/>
+              </a:spcBef>
+              <a:spcAft>
+                <a:spcPts val="0"/>
+              </a:spcAft>
+              <a:buClr>
+                <a:schemeClr val="dk1"/>
+              </a:buClr>
+              <a:buSzPts val="2800"/>
+              <a:buFont typeface="Arial"/>
+              <a:buNone/>
+              <a:defRPr sz="2800" b="0" i="0" u="none" strike="noStrike" cap="none">
+                <a:solidFill>
+                  <a:schemeClr val="dk1"/>
+                </a:solidFill>
+                <a:latin typeface="Arial"/>
+                <a:ea typeface="Arial"/>
+                <a:cs typeface="Arial"/>
+                <a:sym typeface="Arial"/>
+              </a:defRPr>
+            </a:lvl9pPr>
+          </a:lstStyle>
+          <a:p>
+            <a:pPr algn="r"/>
+            <a:r>
+              <a:rPr lang="en-US" dirty="0" smtClean="0">
+                <a:latin typeface="Comfortaa" panose="020B0604020202020204" charset="0"/>
+              </a:rPr>
+              <a:t>04.08 - 06.08</a:t>
+            </a:r>
+            <a:endParaRPr lang="ru-RU" dirty="0">
+              <a:latin typeface="Comfortaa" panose="020B0604020202020204" charset="0"/>
+            </a:endParaRPr>
+          </a:p>
+        </p:txBody>
+      </p:sp>
+    </p:spTree>
+    <p:extLst>
+      <p:ext uri="{BB962C8B-B14F-4D97-AF65-F5344CB8AC3E}">
+        <p14:creationId xmlns:p14="http://schemas.microsoft.com/office/powerpoint/2010/main" val="3665411903"/>
+      </p:ext>
+    </p:extLst>
+  </p:cSld>
+  <p:clrMapOvr>
+    <a:masterClrMapping/>
+  </p:clrMapOvr>
+</p:sld>
+</file>
+
 <file path=ppt/slides/slide2.xml><?xml version="1.0" encoding="utf-8"?>
 <p:sld xmlns:a="http://schemas.openxmlformats.org/drawingml/2006/main" xmlns:r="http://schemas.openxmlformats.org/officeDocument/2006/relationships" xmlns:p="http://schemas.openxmlformats.org/presentationml/2006/main">
   <p:cSld>
@@ -7650,7 +8980,7 @@
               <a:buAutoNum type="arabicPeriod"/>
             </a:pPr>
             <a:r>
-              <a:rPr lang="ru" sz="2400" b="1">
+              <a:rPr lang="ru" sz="2400" b="1" dirty="0" smtClean="0">
                 <a:solidFill>
                   <a:schemeClr val="dk1"/>
                 </a:solidFill>
@@ -7661,7 +8991,19 @@
               </a:rPr>
               <a:t>Planning</a:t>
             </a:r>
-            <a:endParaRPr sz="2400" b="1">
+            <a:r>
+              <a:rPr lang="en-US" sz="2400" b="1" dirty="0" smtClean="0">
+                <a:solidFill>
+                  <a:schemeClr val="dk1"/>
+                </a:solidFill>
+                <a:latin typeface="Comfortaa"/>
+                <a:ea typeface="Comfortaa"/>
+                <a:cs typeface="Comfortaa"/>
+                <a:sym typeface="Comfortaa"/>
+              </a:rPr>
+              <a:t> </a:t>
+            </a:r>
+            <a:endParaRPr sz="2400" b="1" dirty="0">
               <a:solidFill>
                 <a:schemeClr val="dk1"/>
               </a:solidFill>

</xml_diff>